<commit_message>
making changed to powerpoint
</commit_message>
<xml_diff>
--- a/Presentation/Summit-Pester.pptx
+++ b/Presentation/Summit-Pester.pptx
@@ -366,7 +366,7 @@
             <a:fld id="{B61BEF0D-F0BB-DE4B-95CE-6DB70DBA9567}" type="datetimeFigureOut">
               <a:rPr lang="en-US" smtClean="0"/>
               <a:pPr/>
-              <a:t>3/26/2018</a:t>
+              <a:t>4/2/2018</a:t>
             </a:fld>
             <a:endParaRPr lang="en-US" dirty="0"/>
           </a:p>
@@ -946,7 +946,7 @@
             <a:fld id="{B61BEF0D-F0BB-DE4B-95CE-6DB70DBA9567}" type="datetimeFigureOut">
               <a:rPr lang="en-US" smtClean="0"/>
               <a:pPr/>
-              <a:t>3/26/2018</a:t>
+              <a:t>4/2/2018</a:t>
             </a:fld>
             <a:endParaRPr lang="en-US" dirty="0"/>
           </a:p>
@@ -1188,7 +1188,7 @@
             <a:fld id="{B61BEF0D-F0BB-DE4B-95CE-6DB70DBA9567}" type="datetimeFigureOut">
               <a:rPr lang="en-US" smtClean="0"/>
               <a:pPr/>
-              <a:t>3/26/2018</a:t>
+              <a:t>4/2/2018</a:t>
             </a:fld>
             <a:endParaRPr lang="en-US" dirty="0"/>
           </a:p>
@@ -1444,7 +1444,7 @@
             <a:fld id="{B61BEF0D-F0BB-DE4B-95CE-6DB70DBA9567}" type="datetimeFigureOut">
               <a:rPr lang="en-US" smtClean="0"/>
               <a:pPr/>
-              <a:t>3/26/2018</a:t>
+              <a:t>4/2/2018</a:t>
             </a:fld>
             <a:endParaRPr lang="en-US" dirty="0"/>
           </a:p>
@@ -1805,7 +1805,7 @@
             <a:fld id="{B61BEF0D-F0BB-DE4B-95CE-6DB70DBA9567}" type="datetimeFigureOut">
               <a:rPr lang="en-US" smtClean="0"/>
               <a:pPr/>
-              <a:t>3/26/2018</a:t>
+              <a:t>4/2/2018</a:t>
             </a:fld>
             <a:endParaRPr lang="en-US" dirty="0"/>
           </a:p>
@@ -1919,7 +1919,7 @@
             <a:fld id="{B61BEF0D-F0BB-DE4B-95CE-6DB70DBA9567}" type="datetimeFigureOut">
               <a:rPr lang="en-US" smtClean="0"/>
               <a:pPr/>
-              <a:t>3/26/2018</a:t>
+              <a:t>4/2/2018</a:t>
             </a:fld>
             <a:endParaRPr lang="en-US" dirty="0"/>
           </a:p>
@@ -2011,7 +2011,7 @@
             <a:fld id="{B61BEF0D-F0BB-DE4B-95CE-6DB70DBA9567}" type="datetimeFigureOut">
               <a:rPr lang="en-US" smtClean="0"/>
               <a:pPr/>
-              <a:t>3/26/2018</a:t>
+              <a:t>4/2/2018</a:t>
             </a:fld>
             <a:endParaRPr lang="en-US" dirty="0"/>
           </a:p>
@@ -2283,7 +2283,7 @@
             <a:fld id="{B61BEF0D-F0BB-DE4B-95CE-6DB70DBA9567}" type="datetimeFigureOut">
               <a:rPr lang="en-US" smtClean="0"/>
               <a:pPr/>
-              <a:t>3/26/2018</a:t>
+              <a:t>4/2/2018</a:t>
             </a:fld>
             <a:endParaRPr lang="en-US" dirty="0"/>
           </a:p>
@@ -2532,7 +2532,7 @@
             <a:fld id="{B61BEF0D-F0BB-DE4B-95CE-6DB70DBA9567}" type="datetimeFigureOut">
               <a:rPr lang="en-US" smtClean="0"/>
               <a:pPr/>
-              <a:t>3/26/2018</a:t>
+              <a:t>4/2/2018</a:t>
             </a:fld>
             <a:endParaRPr lang="en-US" dirty="0"/>
           </a:p>
@@ -2740,7 +2740,7 @@
             <a:fld id="{B61BEF0D-F0BB-DE4B-95CE-6DB70DBA9567}" type="datetimeFigureOut">
               <a:rPr lang="en-US" smtClean="0"/>
               <a:pPr/>
-              <a:t>3/26/2018</a:t>
+              <a:t>4/2/2018</a:t>
             </a:fld>
             <a:endParaRPr lang="en-US" dirty="0"/>
           </a:p>
@@ -3598,17 +3598,13 @@
           <a:p>
             <a:r>
               <a:rPr lang="en-US" dirty="0"/>
-              <a:t>Smaller code = smaller tests</a:t>
+              <a:t>Simpler code = simpler tests</a:t>
             </a:r>
           </a:p>
           <a:p>
             <a:r>
               <a:rPr lang="en-US" dirty="0"/>
-              <a:t>Start with what </a:t>
-            </a:r>
-            <a:r>
-              <a:rPr lang="en-US"/>
-              <a:t>you know</a:t>
+              <a:t>Start with what you know</a:t>
             </a:r>
           </a:p>
           <a:p>

</xml_diff>

<commit_message>
Updated Presentation, created bad examples folder
</commit_message>
<xml_diff>
--- a/Presentation/Summit-Pester.pptx
+++ b/Presentation/Summit-Pester.pptx
@@ -359,7 +359,7 @@
             <a:fld id="{B61BEF0D-F0BB-DE4B-95CE-6DB70DBA9567}" type="datetimeFigureOut">
               <a:rPr lang="en-US" smtClean="0"/>
               <a:pPr/>
-              <a:t>4/6/2018</a:t>
+              <a:t>4/9/2018</a:t>
             </a:fld>
             <a:endParaRPr lang="en-US" dirty="0"/>
           </a:p>
@@ -939,7 +939,7 @@
             <a:fld id="{B61BEF0D-F0BB-DE4B-95CE-6DB70DBA9567}" type="datetimeFigureOut">
               <a:rPr lang="en-US" smtClean="0"/>
               <a:pPr/>
-              <a:t>4/6/2018</a:t>
+              <a:t>4/9/2018</a:t>
             </a:fld>
             <a:endParaRPr lang="en-US" dirty="0"/>
           </a:p>
@@ -1181,7 +1181,7 @@
             <a:fld id="{B61BEF0D-F0BB-DE4B-95CE-6DB70DBA9567}" type="datetimeFigureOut">
               <a:rPr lang="en-US" smtClean="0"/>
               <a:pPr/>
-              <a:t>4/6/2018</a:t>
+              <a:t>4/9/2018</a:t>
             </a:fld>
             <a:endParaRPr lang="en-US" dirty="0"/>
           </a:p>
@@ -1437,7 +1437,7 @@
             <a:fld id="{B61BEF0D-F0BB-DE4B-95CE-6DB70DBA9567}" type="datetimeFigureOut">
               <a:rPr lang="en-US" smtClean="0"/>
               <a:pPr/>
-              <a:t>4/6/2018</a:t>
+              <a:t>4/9/2018</a:t>
             </a:fld>
             <a:endParaRPr lang="en-US" dirty="0"/>
           </a:p>
@@ -1798,7 +1798,7 @@
             <a:fld id="{B61BEF0D-F0BB-DE4B-95CE-6DB70DBA9567}" type="datetimeFigureOut">
               <a:rPr lang="en-US" smtClean="0"/>
               <a:pPr/>
-              <a:t>4/6/2018</a:t>
+              <a:t>4/9/2018</a:t>
             </a:fld>
             <a:endParaRPr lang="en-US" dirty="0"/>
           </a:p>
@@ -1912,7 +1912,7 @@
             <a:fld id="{B61BEF0D-F0BB-DE4B-95CE-6DB70DBA9567}" type="datetimeFigureOut">
               <a:rPr lang="en-US" smtClean="0"/>
               <a:pPr/>
-              <a:t>4/6/2018</a:t>
+              <a:t>4/9/2018</a:t>
             </a:fld>
             <a:endParaRPr lang="en-US" dirty="0"/>
           </a:p>
@@ -2004,7 +2004,7 @@
             <a:fld id="{B61BEF0D-F0BB-DE4B-95CE-6DB70DBA9567}" type="datetimeFigureOut">
               <a:rPr lang="en-US" smtClean="0"/>
               <a:pPr/>
-              <a:t>4/6/2018</a:t>
+              <a:t>4/9/2018</a:t>
             </a:fld>
             <a:endParaRPr lang="en-US" dirty="0"/>
           </a:p>
@@ -2276,7 +2276,7 @@
             <a:fld id="{B61BEF0D-F0BB-DE4B-95CE-6DB70DBA9567}" type="datetimeFigureOut">
               <a:rPr lang="en-US" smtClean="0"/>
               <a:pPr/>
-              <a:t>4/6/2018</a:t>
+              <a:t>4/9/2018</a:t>
             </a:fld>
             <a:endParaRPr lang="en-US" dirty="0"/>
           </a:p>
@@ -2525,7 +2525,7 @@
             <a:fld id="{B61BEF0D-F0BB-DE4B-95CE-6DB70DBA9567}" type="datetimeFigureOut">
               <a:rPr lang="en-US" smtClean="0"/>
               <a:pPr/>
-              <a:t>4/6/2018</a:t>
+              <a:t>4/9/2018</a:t>
             </a:fld>
             <a:endParaRPr lang="en-US" dirty="0"/>
           </a:p>
@@ -2733,7 +2733,7 @@
             <a:fld id="{B61BEF0D-F0BB-DE4B-95CE-6DB70DBA9567}" type="datetimeFigureOut">
               <a:rPr lang="en-US" smtClean="0"/>
               <a:pPr/>
-              <a:t>4/6/2018</a:t>
+              <a:t>4/9/2018</a:t>
             </a:fld>
             <a:endParaRPr lang="en-US" dirty="0"/>
           </a:p>
@@ -3281,7 +3281,12 @@
             <p:ph idx="1"/>
           </p:nvPr>
         </p:nvSpPr>
-        <p:spPr/>
+        <p:spPr>
+          <a:xfrm>
+            <a:off x="838200" y="1825625"/>
+            <a:ext cx="10515600" cy="4351338"/>
+          </a:xfrm>
+        </p:spPr>
         <p:txBody>
           <a:bodyPr/>
           <a:lstStyle/>
@@ -3400,7 +3405,7 @@
         </p:blipFill>
         <p:spPr>
           <a:xfrm>
-            <a:off x="3751432" y="1690688"/>
+            <a:off x="2595513" y="1657952"/>
             <a:ext cx="7000973" cy="4649084"/>
           </a:xfrm>
           <a:prstGeom prst="rect">
@@ -3651,6 +3656,127 @@
   <p:clrMapOvr>
     <a:masterClrMapping/>
   </p:clrMapOvr>
+  <p:timing>
+    <p:tnLst>
+      <p:par>
+        <p:cTn id="1" dur="indefinite" restart="never" nodeType="tmRoot">
+          <p:childTnLst>
+            <p:seq concurrent="1" nextAc="seek">
+              <p:cTn id="2" dur="indefinite" nodeType="mainSeq">
+                <p:childTnLst>
+                  <p:par>
+                    <p:cTn id="3" fill="hold">
+                      <p:stCondLst>
+                        <p:cond delay="indefinite"/>
+                      </p:stCondLst>
+                      <p:childTnLst>
+                        <p:par>
+                          <p:cTn id="4" fill="hold">
+                            <p:stCondLst>
+                              <p:cond delay="0"/>
+                            </p:stCondLst>
+                            <p:childTnLst>
+                              <p:par>
+                                <p:cTn id="5" presetID="2" presetClass="entr" presetSubtype="4" fill="hold" nodeType="clickEffect">
+                                  <p:stCondLst>
+                                    <p:cond delay="0"/>
+                                  </p:stCondLst>
+                                  <p:childTnLst>
+                                    <p:set>
+                                      <p:cBhvr>
+                                        <p:cTn id="6" dur="1" fill="hold">
+                                          <p:stCondLst>
+                                            <p:cond delay="0"/>
+                                          </p:stCondLst>
+                                        </p:cTn>
+                                        <p:tgtEl>
+                                          <p:spTgt spid="5"/>
+                                        </p:tgtEl>
+                                        <p:attrNameLst>
+                                          <p:attrName>style.visibility</p:attrName>
+                                        </p:attrNameLst>
+                                      </p:cBhvr>
+                                      <p:to>
+                                        <p:strVal val="visible"/>
+                                      </p:to>
+                                    </p:set>
+                                    <p:anim calcmode="lin" valueType="num">
+                                      <p:cBhvr additive="base">
+                                        <p:cTn id="7" dur="500" fill="hold"/>
+                                        <p:tgtEl>
+                                          <p:spTgt spid="5"/>
+                                        </p:tgtEl>
+                                        <p:attrNameLst>
+                                          <p:attrName>ppt_x</p:attrName>
+                                        </p:attrNameLst>
+                                      </p:cBhvr>
+                                      <p:tavLst>
+                                        <p:tav tm="0">
+                                          <p:val>
+                                            <p:strVal val="#ppt_x"/>
+                                          </p:val>
+                                        </p:tav>
+                                        <p:tav tm="100000">
+                                          <p:val>
+                                            <p:strVal val="#ppt_x"/>
+                                          </p:val>
+                                        </p:tav>
+                                      </p:tavLst>
+                                    </p:anim>
+                                    <p:anim calcmode="lin" valueType="num">
+                                      <p:cBhvr additive="base">
+                                        <p:cTn id="8" dur="500" fill="hold"/>
+                                        <p:tgtEl>
+                                          <p:spTgt spid="5"/>
+                                        </p:tgtEl>
+                                        <p:attrNameLst>
+                                          <p:attrName>ppt_y</p:attrName>
+                                        </p:attrNameLst>
+                                      </p:cBhvr>
+                                      <p:tavLst>
+                                        <p:tav tm="0">
+                                          <p:val>
+                                            <p:strVal val="1+#ppt_h/2"/>
+                                          </p:val>
+                                        </p:tav>
+                                        <p:tav tm="100000">
+                                          <p:val>
+                                            <p:strVal val="#ppt_y"/>
+                                          </p:val>
+                                        </p:tav>
+                                      </p:tavLst>
+                                    </p:anim>
+                                  </p:childTnLst>
+                                </p:cTn>
+                              </p:par>
+                            </p:childTnLst>
+                          </p:cTn>
+                        </p:par>
+                      </p:childTnLst>
+                    </p:cTn>
+                  </p:par>
+                </p:childTnLst>
+              </p:cTn>
+              <p:prevCondLst>
+                <p:cond evt="onPrev" delay="0">
+                  <p:tgtEl>
+                    <p:sldTgt/>
+                  </p:tgtEl>
+                </p:cond>
+              </p:prevCondLst>
+              <p:nextCondLst>
+                <p:cond evt="onNext" delay="0">
+                  <p:tgtEl>
+                    <p:sldTgt/>
+                  </p:tgtEl>
+                </p:cond>
+              </p:nextCondLst>
+            </p:seq>
+          </p:childTnLst>
+        </p:cTn>
+      </p:par>
+    </p:tnLst>
+  </p:timing>
 </p:sld>
 </file>
 
@@ -3720,6 +3846,18 @@
           <a:bodyPr/>
           <a:lstStyle/>
           <a:p>
+            <a:endParaRPr lang="en-US" dirty="0"/>
+          </a:p>
+          <a:p>
+            <a:endParaRPr lang="en-US" dirty="0"/>
+          </a:p>
+          <a:p>
+            <a:endParaRPr lang="en-US" dirty="0"/>
+          </a:p>
+          <a:p>
+            <a:endParaRPr lang="en-US" dirty="0"/>
+          </a:p>
+          <a:p>
             <a:r>
               <a:rPr lang="en-US" dirty="0"/>
               <a:t>Simpler code = simpler tests</a:t>
@@ -3740,13 +3878,8 @@
           <a:p>
             <a:r>
               <a:rPr lang="en-US" dirty="0"/>
-              <a:t>Write the </a:t>
-            </a:r>
-            <a:r>
-              <a:rPr lang="en-US"/>
-              <a:t>first test</a:t>
-            </a:r>
-            <a:endParaRPr lang="en-US" dirty="0"/>
+              <a:t>Understand what to Mock</a:t>
+            </a:r>
           </a:p>
           <a:p>
             <a:endParaRPr lang="en-US" dirty="0"/>
@@ -3920,7 +4053,7 @@
                                         <p:tgtEl>
                                           <p:spTgt spid="3">
                                             <p:txEl>
-                                              <p:pRg st="0" end="0"/>
+                                              <p:pRg st="4" end="4"/>
                                             </p:txEl>
                                           </p:spTgt>
                                         </p:tgtEl>
@@ -3938,7 +4071,7 @@
                                         <p:tgtEl>
                                           <p:spTgt spid="3">
                                             <p:txEl>
-                                              <p:pRg st="0" end="0"/>
+                                              <p:pRg st="4" end="4"/>
                                             </p:txEl>
                                           </p:spTgt>
                                         </p:tgtEl>
@@ -3965,7 +4098,7 @@
                                         <p:tgtEl>
                                           <p:spTgt spid="3">
                                             <p:txEl>
-                                              <p:pRg st="0" end="0"/>
+                                              <p:pRg st="4" end="4"/>
                                             </p:txEl>
                                           </p:spTgt>
                                         </p:tgtEl>
@@ -4023,7 +4156,7 @@
                                         <p:tgtEl>
                                           <p:spTgt spid="3">
                                             <p:txEl>
-                                              <p:pRg st="1" end="1"/>
+                                              <p:pRg st="5" end="5"/>
                                             </p:txEl>
                                           </p:spTgt>
                                         </p:tgtEl>
@@ -4041,7 +4174,7 @@
                                         <p:tgtEl>
                                           <p:spTgt spid="3">
                                             <p:txEl>
-                                              <p:pRg st="1" end="1"/>
+                                              <p:pRg st="5" end="5"/>
                                             </p:txEl>
                                           </p:spTgt>
                                         </p:tgtEl>
@@ -4068,7 +4201,7 @@
                                         <p:tgtEl>
                                           <p:spTgt spid="3">
                                             <p:txEl>
-                                              <p:pRg st="1" end="1"/>
+                                              <p:pRg st="5" end="5"/>
                                             </p:txEl>
                                           </p:spTgt>
                                         </p:tgtEl>
@@ -4126,7 +4259,7 @@
                                         <p:tgtEl>
                                           <p:spTgt spid="3">
                                             <p:txEl>
-                                              <p:pRg st="2" end="2"/>
+                                              <p:pRg st="6" end="6"/>
                                             </p:txEl>
                                           </p:spTgt>
                                         </p:tgtEl>
@@ -4144,7 +4277,7 @@
                                         <p:tgtEl>
                                           <p:spTgt spid="3">
                                             <p:txEl>
-                                              <p:pRg st="2" end="2"/>
+                                              <p:pRg st="6" end="6"/>
                                             </p:txEl>
                                           </p:spTgt>
                                         </p:tgtEl>
@@ -4171,7 +4304,7 @@
                                         <p:tgtEl>
                                           <p:spTgt spid="3">
                                             <p:txEl>
-                                              <p:pRg st="2" end="2"/>
+                                              <p:pRg st="6" end="6"/>
                                             </p:txEl>
                                           </p:spTgt>
                                         </p:tgtEl>
@@ -4229,7 +4362,7 @@
                                         <p:tgtEl>
                                           <p:spTgt spid="3">
                                             <p:txEl>
-                                              <p:pRg st="3" end="3"/>
+                                              <p:pRg st="7" end="7"/>
                                             </p:txEl>
                                           </p:spTgt>
                                         </p:tgtEl>
@@ -4247,7 +4380,7 @@
                                         <p:tgtEl>
                                           <p:spTgt spid="3">
                                             <p:txEl>
-                                              <p:pRg st="3" end="3"/>
+                                              <p:pRg st="7" end="7"/>
                                             </p:txEl>
                                           </p:spTgt>
                                         </p:tgtEl>
@@ -4274,7 +4407,7 @@
                                         <p:tgtEl>
                                           <p:spTgt spid="3">
                                             <p:txEl>
-                                              <p:pRg st="3" end="3"/>
+                                              <p:pRg st="7" end="7"/>
                                             </p:txEl>
                                           </p:spTgt>
                                         </p:tgtEl>
@@ -4457,11 +4590,53 @@
           <a:p>
             <a:r>
               <a:rPr lang="en-US" dirty="0"/>
+              <a:t>Start simple</a:t>
+            </a:r>
+          </a:p>
+          <a:p>
+            <a:r>
+              <a:rPr lang="en-US" dirty="0"/>
+              <a:t>Understand what to Mock</a:t>
+            </a:r>
+          </a:p>
+          <a:p>
+            <a:r>
+              <a:rPr lang="en-US" dirty="0"/>
               <a:t>Pester Yourself!!</a:t>
             </a:r>
           </a:p>
         </p:txBody>
       </p:sp>
+      <p:pic>
+        <p:nvPicPr>
+          <p:cNvPr id="5" name="Picture 4">
+            <a:extLst>
+              <a:ext uri="{FF2B5EF4-FFF2-40B4-BE49-F238E27FC236}">
+                <a16:creationId xmlns:a16="http://schemas.microsoft.com/office/drawing/2014/main" id="{17C8C793-A932-4254-87D8-FA2365793A5C}"/>
+              </a:ext>
+            </a:extLst>
+          </p:cNvPr>
+          <p:cNvPicPr>
+            <a:picLocks noChangeAspect="1"/>
+          </p:cNvPicPr>
+          <p:nvPr/>
+        </p:nvPicPr>
+        <p:blipFill>
+          <a:blip r:embed="rId2"/>
+          <a:stretch>
+            <a:fillRect/>
+          </a:stretch>
+        </p:blipFill>
+        <p:spPr>
+          <a:xfrm>
+            <a:off x="6260690" y="1379432"/>
+            <a:ext cx="4483510" cy="5237947"/>
+          </a:xfrm>
+          <a:prstGeom prst="rect">
+            <a:avLst/>
+          </a:prstGeom>
+        </p:spPr>
+      </p:pic>
     </p:spTree>
     <p:extLst>
       <p:ext uri="{BB962C8B-B14F-4D97-AF65-F5344CB8AC3E}">

</xml_diff>

<commit_message>
Updated Presentation, no copyright images
</commit_message>
<xml_diff>
--- a/Presentation/Summit-Pester.pptx
+++ b/Presentation/Summit-Pester.pptx
@@ -359,7 +359,7 @@
             <a:fld id="{B61BEF0D-F0BB-DE4B-95CE-6DB70DBA9567}" type="datetimeFigureOut">
               <a:rPr lang="en-US" smtClean="0"/>
               <a:pPr/>
-              <a:t>4/9/2018</a:t>
+              <a:t>4/11/2018</a:t>
             </a:fld>
             <a:endParaRPr lang="en-US" dirty="0"/>
           </a:p>
@@ -939,7 +939,7 @@
             <a:fld id="{B61BEF0D-F0BB-DE4B-95CE-6DB70DBA9567}" type="datetimeFigureOut">
               <a:rPr lang="en-US" smtClean="0"/>
               <a:pPr/>
-              <a:t>4/9/2018</a:t>
+              <a:t>4/11/2018</a:t>
             </a:fld>
             <a:endParaRPr lang="en-US" dirty="0"/>
           </a:p>
@@ -1181,7 +1181,7 @@
             <a:fld id="{B61BEF0D-F0BB-DE4B-95CE-6DB70DBA9567}" type="datetimeFigureOut">
               <a:rPr lang="en-US" smtClean="0"/>
               <a:pPr/>
-              <a:t>4/9/2018</a:t>
+              <a:t>4/11/2018</a:t>
             </a:fld>
             <a:endParaRPr lang="en-US" dirty="0"/>
           </a:p>
@@ -1437,7 +1437,7 @@
             <a:fld id="{B61BEF0D-F0BB-DE4B-95CE-6DB70DBA9567}" type="datetimeFigureOut">
               <a:rPr lang="en-US" smtClean="0"/>
               <a:pPr/>
-              <a:t>4/9/2018</a:t>
+              <a:t>4/11/2018</a:t>
             </a:fld>
             <a:endParaRPr lang="en-US" dirty="0"/>
           </a:p>
@@ -1798,7 +1798,7 @@
             <a:fld id="{B61BEF0D-F0BB-DE4B-95CE-6DB70DBA9567}" type="datetimeFigureOut">
               <a:rPr lang="en-US" smtClean="0"/>
               <a:pPr/>
-              <a:t>4/9/2018</a:t>
+              <a:t>4/11/2018</a:t>
             </a:fld>
             <a:endParaRPr lang="en-US" dirty="0"/>
           </a:p>
@@ -1912,7 +1912,7 @@
             <a:fld id="{B61BEF0D-F0BB-DE4B-95CE-6DB70DBA9567}" type="datetimeFigureOut">
               <a:rPr lang="en-US" smtClean="0"/>
               <a:pPr/>
-              <a:t>4/9/2018</a:t>
+              <a:t>4/11/2018</a:t>
             </a:fld>
             <a:endParaRPr lang="en-US" dirty="0"/>
           </a:p>
@@ -2004,7 +2004,7 @@
             <a:fld id="{B61BEF0D-F0BB-DE4B-95CE-6DB70DBA9567}" type="datetimeFigureOut">
               <a:rPr lang="en-US" smtClean="0"/>
               <a:pPr/>
-              <a:t>4/9/2018</a:t>
+              <a:t>4/11/2018</a:t>
             </a:fld>
             <a:endParaRPr lang="en-US" dirty="0"/>
           </a:p>
@@ -2276,7 +2276,7 @@
             <a:fld id="{B61BEF0D-F0BB-DE4B-95CE-6DB70DBA9567}" type="datetimeFigureOut">
               <a:rPr lang="en-US" smtClean="0"/>
               <a:pPr/>
-              <a:t>4/9/2018</a:t>
+              <a:t>4/11/2018</a:t>
             </a:fld>
             <a:endParaRPr lang="en-US" dirty="0"/>
           </a:p>
@@ -2525,7 +2525,7 @@
             <a:fld id="{B61BEF0D-F0BB-DE4B-95CE-6DB70DBA9567}" type="datetimeFigureOut">
               <a:rPr lang="en-US" smtClean="0"/>
               <a:pPr/>
-              <a:t>4/9/2018</a:t>
+              <a:t>4/11/2018</a:t>
             </a:fld>
             <a:endParaRPr lang="en-US" dirty="0"/>
           </a:p>
@@ -2733,7 +2733,7 @@
             <a:fld id="{B61BEF0D-F0BB-DE4B-95CE-6DB70DBA9567}" type="datetimeFigureOut">
               <a:rPr lang="en-US" smtClean="0"/>
               <a:pPr/>
-              <a:t>4/9/2018</a:t>
+              <a:t>4/11/2018</a:t>
             </a:fld>
             <a:endParaRPr lang="en-US" dirty="0"/>
           </a:p>
@@ -3214,7 +3214,7 @@
           <a:p>
             <a:r>
               <a:rPr lang="en-US" dirty="0"/>
-              <a:t>Speaker: Me (Jim Arruda)</a:t>
+              <a:t>Speaker: Jim Arruda</a:t>
             </a:r>
           </a:p>
         </p:txBody>
@@ -3265,7 +3265,7 @@
           <a:lstStyle/>
           <a:p>
             <a:r>
-              <a:rPr lang="en-US" dirty="0"/>
+              <a:rPr lang="en-US" b="1" dirty="0"/>
               <a:t>Agenda</a:t>
             </a:r>
           </a:p>
@@ -3377,7 +3377,7 @@
           <a:lstStyle/>
           <a:p>
             <a:r>
-              <a:rPr lang="en-US" dirty="0"/>
+              <a:rPr lang="en-US" b="1" dirty="0"/>
               <a:t>Why are you Pestering me?</a:t>
             </a:r>
           </a:p>
@@ -3385,17 +3385,19 @@
       </p:sp>
       <p:pic>
         <p:nvPicPr>
-          <p:cNvPr id="4" name="Picture 3">
+          <p:cNvPr id="5" name="Content Placeholder 4">
             <a:extLst>
               <a:ext uri="{FF2B5EF4-FFF2-40B4-BE49-F238E27FC236}">
-                <a16:creationId xmlns:a16="http://schemas.microsoft.com/office/drawing/2014/main" id="{15B60047-6C1C-4170-886C-7580D2A1548A}"/>
+                <a16:creationId xmlns:a16="http://schemas.microsoft.com/office/drawing/2014/main" id="{42A7E10D-18AB-420B-B8EA-A457B8D06855}"/>
               </a:ext>
             </a:extLst>
           </p:cNvPr>
           <p:cNvPicPr>
-            <a:picLocks noChangeAspect="1"/>
+            <a:picLocks noGrp="1" noChangeAspect="1"/>
           </p:cNvPicPr>
-          <p:nvPr/>
+          <p:nvPr>
+            <p:ph idx="1"/>
+          </p:nvPr>
         </p:nvPicPr>
         <p:blipFill>
           <a:blip r:embed="rId2"/>
@@ -3405,251 +3407,15 @@
         </p:blipFill>
         <p:spPr>
           <a:xfrm>
-            <a:off x="2595513" y="1657952"/>
-            <a:ext cx="7000973" cy="4649084"/>
-          </a:xfrm>
-          <a:prstGeom prst="rect">
-            <a:avLst/>
-          </a:prstGeom>
-        </p:spPr>
-      </p:pic>
-      <p:sp>
-        <p:nvSpPr>
-          <p:cNvPr id="6" name="Content Placeholder 5">
-            <a:extLst>
-              <a:ext uri="{FF2B5EF4-FFF2-40B4-BE49-F238E27FC236}">
-                <a16:creationId xmlns:a16="http://schemas.microsoft.com/office/drawing/2014/main" id="{DBBEC9FC-830A-42F7-BD99-F5BF6F5CB51E}"/>
-              </a:ext>
-            </a:extLst>
-          </p:cNvPr>
-          <p:cNvSpPr>
-            <a:spLocks noGrp="1"/>
-          </p:cNvSpPr>
-          <p:nvPr>
-            <p:ph idx="1"/>
-          </p:nvPr>
-        </p:nvSpPr>
-        <p:spPr/>
-        <p:txBody>
-          <a:bodyPr/>
-          <a:lstStyle/>
-          <a:p>
-            <a:endParaRPr lang="en-US" dirty="0"/>
-          </a:p>
-        </p:txBody>
-      </p:sp>
-    </p:spTree>
-    <p:extLst>
-      <p:ext uri="{BB962C8B-B14F-4D97-AF65-F5344CB8AC3E}">
-        <p14:creationId xmlns:p14="http://schemas.microsoft.com/office/powerpoint/2010/main" val="3041081814"/>
-      </p:ext>
-    </p:extLst>
-  </p:cSld>
-  <p:clrMapOvr>
-    <a:masterClrMapping/>
-  </p:clrMapOvr>
-  <p:timing>
-    <p:tnLst>
-      <p:par>
-        <p:cTn id="1" dur="indefinite" restart="never" nodeType="tmRoot">
-          <p:childTnLst>
-            <p:seq concurrent="1" nextAc="seek">
-              <p:cTn id="2" dur="indefinite" nodeType="mainSeq">
-                <p:childTnLst>
-                  <p:par>
-                    <p:cTn id="3" fill="hold">
-                      <p:stCondLst>
-                        <p:cond delay="indefinite"/>
-                      </p:stCondLst>
-                      <p:childTnLst>
-                        <p:par>
-                          <p:cTn id="4" fill="hold">
-                            <p:stCondLst>
-                              <p:cond delay="0"/>
-                            </p:stCondLst>
-                            <p:childTnLst>
-                              <p:par>
-                                <p:cTn id="5" presetID="2" presetClass="entr" presetSubtype="4" fill="hold" nodeType="clickEffect">
-                                  <p:stCondLst>
-                                    <p:cond delay="0"/>
-                                  </p:stCondLst>
-                                  <p:childTnLst>
-                                    <p:set>
-                                      <p:cBhvr>
-                                        <p:cTn id="6" dur="1" fill="hold">
-                                          <p:stCondLst>
-                                            <p:cond delay="0"/>
-                                          </p:stCondLst>
-                                        </p:cTn>
-                                        <p:tgtEl>
-                                          <p:spTgt spid="4"/>
-                                        </p:tgtEl>
-                                        <p:attrNameLst>
-                                          <p:attrName>style.visibility</p:attrName>
-                                        </p:attrNameLst>
-                                      </p:cBhvr>
-                                      <p:to>
-                                        <p:strVal val="visible"/>
-                                      </p:to>
-                                    </p:set>
-                                    <p:anim calcmode="lin" valueType="num">
-                                      <p:cBhvr additive="base">
-                                        <p:cTn id="7" dur="500" fill="hold"/>
-                                        <p:tgtEl>
-                                          <p:spTgt spid="4"/>
-                                        </p:tgtEl>
-                                        <p:attrNameLst>
-                                          <p:attrName>ppt_x</p:attrName>
-                                        </p:attrNameLst>
-                                      </p:cBhvr>
-                                      <p:tavLst>
-                                        <p:tav tm="0">
-                                          <p:val>
-                                            <p:strVal val="#ppt_x"/>
-                                          </p:val>
-                                        </p:tav>
-                                        <p:tav tm="100000">
-                                          <p:val>
-                                            <p:strVal val="#ppt_x"/>
-                                          </p:val>
-                                        </p:tav>
-                                      </p:tavLst>
-                                    </p:anim>
-                                    <p:anim calcmode="lin" valueType="num">
-                                      <p:cBhvr additive="base">
-                                        <p:cTn id="8" dur="500" fill="hold"/>
-                                        <p:tgtEl>
-                                          <p:spTgt spid="4"/>
-                                        </p:tgtEl>
-                                        <p:attrNameLst>
-                                          <p:attrName>ppt_y</p:attrName>
-                                        </p:attrNameLst>
-                                      </p:cBhvr>
-                                      <p:tavLst>
-                                        <p:tav tm="0">
-                                          <p:val>
-                                            <p:strVal val="1+#ppt_h/2"/>
-                                          </p:val>
-                                        </p:tav>
-                                        <p:tav tm="100000">
-                                          <p:val>
-                                            <p:strVal val="#ppt_y"/>
-                                          </p:val>
-                                        </p:tav>
-                                      </p:tavLst>
-                                    </p:anim>
-                                  </p:childTnLst>
-                                </p:cTn>
-                              </p:par>
-                            </p:childTnLst>
-                          </p:cTn>
-                        </p:par>
-                      </p:childTnLst>
-                    </p:cTn>
-                  </p:par>
-                </p:childTnLst>
-              </p:cTn>
-              <p:prevCondLst>
-                <p:cond evt="onPrev" delay="0">
-                  <p:tgtEl>
-                    <p:sldTgt/>
-                  </p:tgtEl>
-                </p:cond>
-              </p:prevCondLst>
-              <p:nextCondLst>
-                <p:cond evt="onNext" delay="0">
-                  <p:tgtEl>
-                    <p:sldTgt/>
-                  </p:tgtEl>
-                </p:cond>
-              </p:nextCondLst>
-            </p:seq>
-          </p:childTnLst>
-        </p:cTn>
-      </p:par>
-    </p:tnLst>
-  </p:timing>
-</p:sld>
-</file>
-
-<file path=ppt/slides/slide4.xml><?xml version="1.0" encoding="utf-8"?>
-<p:sld xmlns:a="http://schemas.openxmlformats.org/drawingml/2006/main" xmlns:r="http://schemas.openxmlformats.org/officeDocument/2006/relationships" xmlns:p="http://schemas.openxmlformats.org/presentationml/2006/main">
-  <p:cSld>
-    <p:spTree>
-      <p:nvGrpSpPr>
-        <p:cNvPr id="1" name=""/>
-        <p:cNvGrpSpPr/>
-        <p:nvPr/>
-      </p:nvGrpSpPr>
-      <p:grpSpPr>
-        <a:xfrm>
-          <a:off x="0" y="0"/>
-          <a:ext cx="0" cy="0"/>
-          <a:chOff x="0" y="0"/>
-          <a:chExt cx="0" cy="0"/>
-        </a:xfrm>
-      </p:grpSpPr>
-      <p:sp>
-        <p:nvSpPr>
-          <p:cNvPr id="2" name="Title 1">
-            <a:extLst>
-              <a:ext uri="{FF2B5EF4-FFF2-40B4-BE49-F238E27FC236}">
-                <a16:creationId xmlns:a16="http://schemas.microsoft.com/office/drawing/2014/main" id="{82D9476E-672B-4B56-8001-B563B1A35A78}"/>
-              </a:ext>
-            </a:extLst>
-          </p:cNvPr>
-          <p:cNvSpPr>
-            <a:spLocks noGrp="1"/>
-          </p:cNvSpPr>
-          <p:nvPr>
-            <p:ph type="title"/>
-          </p:nvPr>
-        </p:nvSpPr>
-        <p:spPr/>
-        <p:txBody>
-          <a:bodyPr/>
-          <a:lstStyle/>
-          <a:p>
-            <a:r>
-              <a:rPr lang="en-US" dirty="0"/>
-              <a:t>			Be a Dummy! Test first!</a:t>
-            </a:r>
-          </a:p>
-        </p:txBody>
-      </p:sp>
-      <p:pic>
-        <p:nvPicPr>
-          <p:cNvPr id="5" name="Content Placeholder 4">
-            <a:extLst>
-              <a:ext uri="{FF2B5EF4-FFF2-40B4-BE49-F238E27FC236}">
-                <a16:creationId xmlns:a16="http://schemas.microsoft.com/office/drawing/2014/main" id="{4F1575DB-EF43-4CB9-8F97-D631749166C2}"/>
-              </a:ext>
-            </a:extLst>
-          </p:cNvPr>
-          <p:cNvPicPr>
-            <a:picLocks noGrp="1" noChangeAspect="1"/>
-          </p:cNvPicPr>
-          <p:nvPr>
-            <p:ph idx="1"/>
-          </p:nvPr>
-        </p:nvPicPr>
-        <p:blipFill>
-          <a:blip r:embed="rId2"/>
-          <a:stretch>
-            <a:fillRect/>
-          </a:stretch>
-        </p:blipFill>
-        <p:spPr>
-          <a:xfrm>
-            <a:off x="2838749" y="1606999"/>
-            <a:ext cx="6514501" cy="4885876"/>
+            <a:off x="2981444" y="1690688"/>
+            <a:ext cx="6229112" cy="4671834"/>
           </a:xfrm>
         </p:spPr>
       </p:pic>
     </p:spTree>
     <p:extLst>
       <p:ext uri="{BB962C8B-B14F-4D97-AF65-F5344CB8AC3E}">
-        <p14:creationId xmlns:p14="http://schemas.microsoft.com/office/powerpoint/2010/main" val="1941123287"/>
+        <p14:creationId xmlns:p14="http://schemas.microsoft.com/office/powerpoint/2010/main" val="3041081814"/>
       </p:ext>
     </p:extLst>
   </p:cSld>
@@ -3780,6 +3546,214 @@
 </p:sld>
 </file>
 
+<file path=ppt/slides/slide4.xml><?xml version="1.0" encoding="utf-8"?>
+<p:sld xmlns:a="http://schemas.openxmlformats.org/drawingml/2006/main" xmlns:r="http://schemas.openxmlformats.org/officeDocument/2006/relationships" xmlns:p="http://schemas.openxmlformats.org/presentationml/2006/main">
+  <p:cSld>
+    <p:spTree>
+      <p:nvGrpSpPr>
+        <p:cNvPr id="1" name=""/>
+        <p:cNvGrpSpPr/>
+        <p:nvPr/>
+      </p:nvGrpSpPr>
+      <p:grpSpPr>
+        <a:xfrm>
+          <a:off x="0" y="0"/>
+          <a:ext cx="0" cy="0"/>
+          <a:chOff x="0" y="0"/>
+          <a:chExt cx="0" cy="0"/>
+        </a:xfrm>
+      </p:grpSpPr>
+      <p:sp>
+        <p:nvSpPr>
+          <p:cNvPr id="2" name="Title 1">
+            <a:extLst>
+              <a:ext uri="{FF2B5EF4-FFF2-40B4-BE49-F238E27FC236}">
+                <a16:creationId xmlns:a16="http://schemas.microsoft.com/office/drawing/2014/main" id="{82D9476E-672B-4B56-8001-B563B1A35A78}"/>
+              </a:ext>
+            </a:extLst>
+          </p:cNvPr>
+          <p:cNvSpPr>
+            <a:spLocks noGrp="1"/>
+          </p:cNvSpPr>
+          <p:nvPr>
+            <p:ph type="title"/>
+          </p:nvPr>
+        </p:nvSpPr>
+        <p:spPr/>
+        <p:txBody>
+          <a:bodyPr/>
+          <a:lstStyle/>
+          <a:p>
+            <a:r>
+              <a:rPr lang="en-US" dirty="0"/>
+              <a:t>  			Be a Dummy! Test first!</a:t>
+            </a:r>
+          </a:p>
+        </p:txBody>
+      </p:sp>
+      <p:pic>
+        <p:nvPicPr>
+          <p:cNvPr id="6" name="Content Placeholder 5">
+            <a:extLst>
+              <a:ext uri="{FF2B5EF4-FFF2-40B4-BE49-F238E27FC236}">
+                <a16:creationId xmlns:a16="http://schemas.microsoft.com/office/drawing/2014/main" id="{6A59BDA7-0C29-46ED-80A7-D234A7F5F615}"/>
+              </a:ext>
+            </a:extLst>
+          </p:cNvPr>
+          <p:cNvPicPr>
+            <a:picLocks noGrp="1" noChangeAspect="1"/>
+          </p:cNvPicPr>
+          <p:nvPr>
+            <p:ph idx="1"/>
+          </p:nvPr>
+        </p:nvPicPr>
+        <p:blipFill>
+          <a:blip r:embed="rId2"/>
+          <a:stretch>
+            <a:fillRect/>
+          </a:stretch>
+        </p:blipFill>
+        <p:spPr>
+          <a:xfrm>
+            <a:off x="2160600" y="1394824"/>
+            <a:ext cx="7870800" cy="4931578"/>
+          </a:xfrm>
+        </p:spPr>
+      </p:pic>
+    </p:spTree>
+    <p:extLst>
+      <p:ext uri="{BB962C8B-B14F-4D97-AF65-F5344CB8AC3E}">
+        <p14:creationId xmlns:p14="http://schemas.microsoft.com/office/powerpoint/2010/main" val="1941123287"/>
+      </p:ext>
+    </p:extLst>
+  </p:cSld>
+  <p:clrMapOvr>
+    <a:masterClrMapping/>
+  </p:clrMapOvr>
+  <p:timing>
+    <p:tnLst>
+      <p:par>
+        <p:cTn id="1" dur="indefinite" restart="never" nodeType="tmRoot">
+          <p:childTnLst>
+            <p:seq concurrent="1" nextAc="seek">
+              <p:cTn id="2" dur="indefinite" nodeType="mainSeq">
+                <p:childTnLst>
+                  <p:par>
+                    <p:cTn id="3" fill="hold">
+                      <p:stCondLst>
+                        <p:cond delay="indefinite"/>
+                      </p:stCondLst>
+                      <p:childTnLst>
+                        <p:par>
+                          <p:cTn id="4" fill="hold">
+                            <p:stCondLst>
+                              <p:cond delay="0"/>
+                            </p:stCondLst>
+                            <p:childTnLst>
+                              <p:par>
+                                <p:cTn id="5" presetID="2" presetClass="entr" presetSubtype="4" fill="hold" nodeType="clickEffect">
+                                  <p:stCondLst>
+                                    <p:cond delay="0"/>
+                                  </p:stCondLst>
+                                  <p:childTnLst>
+                                    <p:set>
+                                      <p:cBhvr>
+                                        <p:cTn id="6" dur="1" fill="hold">
+                                          <p:stCondLst>
+                                            <p:cond delay="0"/>
+                                          </p:stCondLst>
+                                        </p:cTn>
+                                        <p:tgtEl>
+                                          <p:spTgt spid="6"/>
+                                        </p:tgtEl>
+                                        <p:attrNameLst>
+                                          <p:attrName>style.visibility</p:attrName>
+                                        </p:attrNameLst>
+                                      </p:cBhvr>
+                                      <p:to>
+                                        <p:strVal val="visible"/>
+                                      </p:to>
+                                    </p:set>
+                                    <p:anim calcmode="lin" valueType="num">
+                                      <p:cBhvr additive="base">
+                                        <p:cTn id="7" dur="500" fill="hold"/>
+                                        <p:tgtEl>
+                                          <p:spTgt spid="6"/>
+                                        </p:tgtEl>
+                                        <p:attrNameLst>
+                                          <p:attrName>ppt_x</p:attrName>
+                                        </p:attrNameLst>
+                                      </p:cBhvr>
+                                      <p:tavLst>
+                                        <p:tav tm="0">
+                                          <p:val>
+                                            <p:strVal val="#ppt_x"/>
+                                          </p:val>
+                                        </p:tav>
+                                        <p:tav tm="100000">
+                                          <p:val>
+                                            <p:strVal val="#ppt_x"/>
+                                          </p:val>
+                                        </p:tav>
+                                      </p:tavLst>
+                                    </p:anim>
+                                    <p:anim calcmode="lin" valueType="num">
+                                      <p:cBhvr additive="base">
+                                        <p:cTn id="8" dur="500" fill="hold"/>
+                                        <p:tgtEl>
+                                          <p:spTgt spid="6"/>
+                                        </p:tgtEl>
+                                        <p:attrNameLst>
+                                          <p:attrName>ppt_y</p:attrName>
+                                        </p:attrNameLst>
+                                      </p:cBhvr>
+                                      <p:tavLst>
+                                        <p:tav tm="0">
+                                          <p:val>
+                                            <p:strVal val="1+#ppt_h/2"/>
+                                          </p:val>
+                                        </p:tav>
+                                        <p:tav tm="100000">
+                                          <p:val>
+                                            <p:strVal val="#ppt_y"/>
+                                          </p:val>
+                                        </p:tav>
+                                      </p:tavLst>
+                                    </p:anim>
+                                  </p:childTnLst>
+                                </p:cTn>
+                              </p:par>
+                            </p:childTnLst>
+                          </p:cTn>
+                        </p:par>
+                      </p:childTnLst>
+                    </p:cTn>
+                  </p:par>
+                </p:childTnLst>
+              </p:cTn>
+              <p:prevCondLst>
+                <p:cond evt="onPrev" delay="0">
+                  <p:tgtEl>
+                    <p:sldTgt/>
+                  </p:tgtEl>
+                </p:cond>
+              </p:prevCondLst>
+              <p:nextCondLst>
+                <p:cond evt="onNext" delay="0">
+                  <p:tgtEl>
+                    <p:sldTgt/>
+                  </p:tgtEl>
+                </p:cond>
+              </p:nextCondLst>
+            </p:seq>
+          </p:childTnLst>
+        </p:cTn>
+      </p:par>
+    </p:tnLst>
+  </p:timing>
+</p:sld>
+</file>
+
 <file path=ppt/slides/slide5.xml><?xml version="1.0" encoding="utf-8"?>
 <p:sld xmlns:a="http://schemas.openxmlformats.org/drawingml/2006/main" xmlns:r="http://schemas.openxmlformats.org/officeDocument/2006/relationships" xmlns:p="http://schemas.openxmlformats.org/presentationml/2006/main">
   <p:cSld>
@@ -3819,7 +3793,7 @@
           <a:lstStyle/>
           <a:p>
             <a:r>
-              <a:rPr lang="en-US" dirty="0"/>
+              <a:rPr lang="en-US" b="1" dirty="0"/>
               <a:t>Where do I start?(Things I learned)</a:t>
             </a:r>
           </a:p>
@@ -3846,18 +3820,6 @@
           <a:bodyPr/>
           <a:lstStyle/>
           <a:p>
-            <a:endParaRPr lang="en-US" dirty="0"/>
-          </a:p>
-          <a:p>
-            <a:endParaRPr lang="en-US" dirty="0"/>
-          </a:p>
-          <a:p>
-            <a:endParaRPr lang="en-US" dirty="0"/>
-          </a:p>
-          <a:p>
-            <a:endParaRPr lang="en-US" dirty="0"/>
-          </a:p>
-          <a:p>
             <a:r>
               <a:rPr lang="en-US" dirty="0"/>
               <a:t>Simpler code = simpler tests</a:t>
@@ -3882,40 +3844,16 @@
             </a:r>
           </a:p>
           <a:p>
+            <a:r>
+              <a:rPr lang="en-US" dirty="0"/>
+              <a:t>Just do it!!</a:t>
+            </a:r>
+          </a:p>
+          <a:p>
             <a:endParaRPr lang="en-US" dirty="0"/>
           </a:p>
         </p:txBody>
       </p:sp>
-      <p:pic>
-        <p:nvPicPr>
-          <p:cNvPr id="5" name="Picture 4">
-            <a:extLst>
-              <a:ext uri="{FF2B5EF4-FFF2-40B4-BE49-F238E27FC236}">
-                <a16:creationId xmlns:a16="http://schemas.microsoft.com/office/drawing/2014/main" id="{1F7C9527-9F03-423C-B334-89349E58819D}"/>
-              </a:ext>
-            </a:extLst>
-          </p:cNvPr>
-          <p:cNvPicPr>
-            <a:picLocks noChangeAspect="1"/>
-          </p:cNvPicPr>
-          <p:nvPr/>
-        </p:nvPicPr>
-        <p:blipFill>
-          <a:blip r:embed="rId2"/>
-          <a:stretch>
-            <a:fillRect/>
-          </a:stretch>
-        </p:blipFill>
-        <p:spPr>
-          <a:xfrm>
-            <a:off x="6096000" y="2271860"/>
-            <a:ext cx="5436989" cy="3630236"/>
-          </a:xfrm>
-          <a:prstGeom prst="rect">
-            <a:avLst/>
-          </a:prstGeom>
-        </p:spPr>
-      </p:pic>
     </p:spTree>
     <p:extLst>
       <p:ext uri="{BB962C8B-B14F-4D97-AF65-F5344CB8AC3E}">
@@ -3960,7 +3898,11 @@
                                           </p:stCondLst>
                                         </p:cTn>
                                         <p:tgtEl>
-                                          <p:spTgt spid="5"/>
+                                          <p:spTgt spid="3">
+                                            <p:txEl>
+                                              <p:pRg st="0" end="0"/>
+                                            </p:txEl>
+                                          </p:spTgt>
                                         </p:tgtEl>
                                         <p:attrNameLst>
                                           <p:attrName>style.visibility</p:attrName>
@@ -3974,7 +3916,11 @@
                                       <p:cBhvr additive="base">
                                         <p:cTn id="7" dur="500" fill="hold"/>
                                         <p:tgtEl>
-                                          <p:spTgt spid="5"/>
+                                          <p:spTgt spid="3">
+                                            <p:txEl>
+                                              <p:pRg st="0" end="0"/>
+                                            </p:txEl>
+                                          </p:spTgt>
                                         </p:tgtEl>
                                         <p:attrNameLst>
                                           <p:attrName>ppt_x</p:attrName>
@@ -3997,7 +3943,11 @@
                                       <p:cBhvr additive="base">
                                         <p:cTn id="8" dur="500" fill="hold"/>
                                         <p:tgtEl>
-                                          <p:spTgt spid="5"/>
+                                          <p:spTgt spid="3">
+                                            <p:txEl>
+                                              <p:pRg st="0" end="0"/>
+                                            </p:txEl>
+                                          </p:spTgt>
                                         </p:tgtEl>
                                         <p:attrNameLst>
                                           <p:attrName>ppt_y</p:attrName>
@@ -4053,7 +4003,7 @@
                                         <p:tgtEl>
                                           <p:spTgt spid="3">
                                             <p:txEl>
-                                              <p:pRg st="4" end="4"/>
+                                              <p:pRg st="1" end="1"/>
                                             </p:txEl>
                                           </p:spTgt>
                                         </p:tgtEl>
@@ -4071,7 +4021,7 @@
                                         <p:tgtEl>
                                           <p:spTgt spid="3">
                                             <p:txEl>
-                                              <p:pRg st="4" end="4"/>
+                                              <p:pRg st="1" end="1"/>
                                             </p:txEl>
                                           </p:spTgt>
                                         </p:tgtEl>
@@ -4098,7 +4048,7 @@
                                         <p:tgtEl>
                                           <p:spTgt spid="3">
                                             <p:txEl>
-                                              <p:pRg st="4" end="4"/>
+                                              <p:pRg st="1" end="1"/>
                                             </p:txEl>
                                           </p:spTgt>
                                         </p:tgtEl>
@@ -4156,7 +4106,7 @@
                                         <p:tgtEl>
                                           <p:spTgt spid="3">
                                             <p:txEl>
-                                              <p:pRg st="5" end="5"/>
+                                              <p:pRg st="2" end="2"/>
                                             </p:txEl>
                                           </p:spTgt>
                                         </p:tgtEl>
@@ -4174,7 +4124,7 @@
                                         <p:tgtEl>
                                           <p:spTgt spid="3">
                                             <p:txEl>
-                                              <p:pRg st="5" end="5"/>
+                                              <p:pRg st="2" end="2"/>
                                             </p:txEl>
                                           </p:spTgt>
                                         </p:tgtEl>
@@ -4201,7 +4151,7 @@
                                         <p:tgtEl>
                                           <p:spTgt spid="3">
                                             <p:txEl>
-                                              <p:pRg st="5" end="5"/>
+                                              <p:pRg st="2" end="2"/>
                                             </p:txEl>
                                           </p:spTgt>
                                         </p:tgtEl>
@@ -4259,7 +4209,7 @@
                                         <p:tgtEl>
                                           <p:spTgt spid="3">
                                             <p:txEl>
-                                              <p:pRg st="6" end="6"/>
+                                              <p:pRg st="3" end="3"/>
                                             </p:txEl>
                                           </p:spTgt>
                                         </p:tgtEl>
@@ -4277,7 +4227,7 @@
                                         <p:tgtEl>
                                           <p:spTgt spid="3">
                                             <p:txEl>
-                                              <p:pRg st="6" end="6"/>
+                                              <p:pRg st="3" end="3"/>
                                             </p:txEl>
                                           </p:spTgt>
                                         </p:tgtEl>
@@ -4304,7 +4254,7 @@
                                         <p:tgtEl>
                                           <p:spTgt spid="3">
                                             <p:txEl>
-                                              <p:pRg st="6" end="6"/>
+                                              <p:pRg st="3" end="3"/>
                                             </p:txEl>
                                           </p:spTgt>
                                         </p:tgtEl>
@@ -4362,7 +4312,7 @@
                                         <p:tgtEl>
                                           <p:spTgt spid="3">
                                             <p:txEl>
-                                              <p:pRg st="7" end="7"/>
+                                              <p:pRg st="4" end="4"/>
                                             </p:txEl>
                                           </p:spTgt>
                                         </p:tgtEl>
@@ -4380,7 +4330,7 @@
                                         <p:tgtEl>
                                           <p:spTgt spid="3">
                                             <p:txEl>
-                                              <p:pRg st="7" end="7"/>
+                                              <p:pRg st="4" end="4"/>
                                             </p:txEl>
                                           </p:spTgt>
                                         </p:tgtEl>
@@ -4407,7 +4357,7 @@
                                         <p:tgtEl>
                                           <p:spTgt spid="3">
                                             <p:txEl>
-                                              <p:pRg st="7" end="7"/>
+                                              <p:pRg st="4" end="4"/>
                                             </p:txEl>
                                           </p:spTgt>
                                         </p:tgtEl>
@@ -4555,7 +4505,7 @@
           <a:lstStyle/>
           <a:p>
             <a:r>
-              <a:rPr lang="en-US" dirty="0"/>
+              <a:rPr lang="en-US" b="1" dirty="0"/>
               <a:t>In Summary</a:t>
             </a:r>
           </a:p>
@@ -4602,41 +4552,23 @@
           <a:p>
             <a:r>
               <a:rPr lang="en-US" dirty="0"/>
-              <a:t>Pester Yourself!!</a:t>
-            </a:r>
-          </a:p>
-        </p:txBody>
-      </p:sp>
-      <p:pic>
-        <p:nvPicPr>
-          <p:cNvPr id="5" name="Picture 4">
-            <a:extLst>
-              <a:ext uri="{FF2B5EF4-FFF2-40B4-BE49-F238E27FC236}">
-                <a16:creationId xmlns:a16="http://schemas.microsoft.com/office/drawing/2014/main" id="{17C8C793-A932-4254-87D8-FA2365793A5C}"/>
-              </a:ext>
-            </a:extLst>
-          </p:cNvPr>
-          <p:cNvPicPr>
-            <a:picLocks noChangeAspect="1"/>
-          </p:cNvPicPr>
-          <p:nvPr/>
-        </p:nvPicPr>
-        <p:blipFill>
-          <a:blip r:embed="rId2"/>
-          <a:stretch>
-            <a:fillRect/>
-          </a:stretch>
-        </p:blipFill>
-        <p:spPr>
-          <a:xfrm>
-            <a:off x="6260690" y="1379432"/>
-            <a:ext cx="4483510" cy="5237947"/>
-          </a:xfrm>
-          <a:prstGeom prst="rect">
-            <a:avLst/>
-          </a:prstGeom>
-        </p:spPr>
-      </p:pic>
+              <a:t>Go Pester Yourself!!</a:t>
+            </a:r>
+          </a:p>
+          <a:p>
+            <a:r>
+              <a:rPr lang="en-US" dirty="0"/>
+              <a:t>Thank you for listening!!</a:t>
+            </a:r>
+          </a:p>
+          <a:p>
+            <a:r>
+              <a:rPr lang="en-US" dirty="0"/>
+              <a:t>Any Questions?</a:t>
+            </a:r>
+          </a:p>
+        </p:txBody>
+      </p:sp>
     </p:spTree>
     <p:extLst>
       <p:ext uri="{BB962C8B-B14F-4D97-AF65-F5344CB8AC3E}">
@@ -4647,6 +4579,636 @@
   <p:clrMapOvr>
     <a:masterClrMapping/>
   </p:clrMapOvr>
+  <p:timing>
+    <p:tnLst>
+      <p:par>
+        <p:cTn id="1" dur="indefinite" restart="never" nodeType="tmRoot">
+          <p:childTnLst>
+            <p:seq concurrent="1" nextAc="seek">
+              <p:cTn id="2" dur="indefinite" nodeType="mainSeq">
+                <p:childTnLst>
+                  <p:par>
+                    <p:cTn id="3" fill="hold">
+                      <p:stCondLst>
+                        <p:cond delay="indefinite"/>
+                      </p:stCondLst>
+                      <p:childTnLst>
+                        <p:par>
+                          <p:cTn id="4" fill="hold">
+                            <p:stCondLst>
+                              <p:cond delay="0"/>
+                            </p:stCondLst>
+                            <p:childTnLst>
+                              <p:par>
+                                <p:cTn id="5" presetID="2" presetClass="entr" presetSubtype="4" fill="hold" nodeType="clickEffect">
+                                  <p:stCondLst>
+                                    <p:cond delay="0"/>
+                                  </p:stCondLst>
+                                  <p:childTnLst>
+                                    <p:set>
+                                      <p:cBhvr>
+                                        <p:cTn id="6" dur="1" fill="hold">
+                                          <p:stCondLst>
+                                            <p:cond delay="0"/>
+                                          </p:stCondLst>
+                                        </p:cTn>
+                                        <p:tgtEl>
+                                          <p:spTgt spid="3">
+                                            <p:txEl>
+                                              <p:pRg st="0" end="0"/>
+                                            </p:txEl>
+                                          </p:spTgt>
+                                        </p:tgtEl>
+                                        <p:attrNameLst>
+                                          <p:attrName>style.visibility</p:attrName>
+                                        </p:attrNameLst>
+                                      </p:cBhvr>
+                                      <p:to>
+                                        <p:strVal val="visible"/>
+                                      </p:to>
+                                    </p:set>
+                                    <p:anim calcmode="lin" valueType="num">
+                                      <p:cBhvr additive="base">
+                                        <p:cTn id="7" dur="500" fill="hold"/>
+                                        <p:tgtEl>
+                                          <p:spTgt spid="3">
+                                            <p:txEl>
+                                              <p:pRg st="0" end="0"/>
+                                            </p:txEl>
+                                          </p:spTgt>
+                                        </p:tgtEl>
+                                        <p:attrNameLst>
+                                          <p:attrName>ppt_x</p:attrName>
+                                        </p:attrNameLst>
+                                      </p:cBhvr>
+                                      <p:tavLst>
+                                        <p:tav tm="0">
+                                          <p:val>
+                                            <p:strVal val="#ppt_x"/>
+                                          </p:val>
+                                        </p:tav>
+                                        <p:tav tm="100000">
+                                          <p:val>
+                                            <p:strVal val="#ppt_x"/>
+                                          </p:val>
+                                        </p:tav>
+                                      </p:tavLst>
+                                    </p:anim>
+                                    <p:anim calcmode="lin" valueType="num">
+                                      <p:cBhvr additive="base">
+                                        <p:cTn id="8" dur="500" fill="hold"/>
+                                        <p:tgtEl>
+                                          <p:spTgt spid="3">
+                                            <p:txEl>
+                                              <p:pRg st="0" end="0"/>
+                                            </p:txEl>
+                                          </p:spTgt>
+                                        </p:tgtEl>
+                                        <p:attrNameLst>
+                                          <p:attrName>ppt_y</p:attrName>
+                                        </p:attrNameLst>
+                                      </p:cBhvr>
+                                      <p:tavLst>
+                                        <p:tav tm="0">
+                                          <p:val>
+                                            <p:strVal val="1+#ppt_h/2"/>
+                                          </p:val>
+                                        </p:tav>
+                                        <p:tav tm="100000">
+                                          <p:val>
+                                            <p:strVal val="#ppt_y"/>
+                                          </p:val>
+                                        </p:tav>
+                                      </p:tavLst>
+                                    </p:anim>
+                                  </p:childTnLst>
+                                </p:cTn>
+                              </p:par>
+                            </p:childTnLst>
+                          </p:cTn>
+                        </p:par>
+                      </p:childTnLst>
+                    </p:cTn>
+                  </p:par>
+                  <p:par>
+                    <p:cTn id="9" fill="hold">
+                      <p:stCondLst>
+                        <p:cond delay="indefinite"/>
+                      </p:stCondLst>
+                      <p:childTnLst>
+                        <p:par>
+                          <p:cTn id="10" fill="hold">
+                            <p:stCondLst>
+                              <p:cond delay="0"/>
+                            </p:stCondLst>
+                            <p:childTnLst>
+                              <p:par>
+                                <p:cTn id="11" presetID="2" presetClass="entr" presetSubtype="4" fill="hold" nodeType="clickEffect">
+                                  <p:stCondLst>
+                                    <p:cond delay="0"/>
+                                  </p:stCondLst>
+                                  <p:childTnLst>
+                                    <p:set>
+                                      <p:cBhvr>
+                                        <p:cTn id="12" dur="1" fill="hold">
+                                          <p:stCondLst>
+                                            <p:cond delay="0"/>
+                                          </p:stCondLst>
+                                        </p:cTn>
+                                        <p:tgtEl>
+                                          <p:spTgt spid="3">
+                                            <p:txEl>
+                                              <p:pRg st="1" end="1"/>
+                                            </p:txEl>
+                                          </p:spTgt>
+                                        </p:tgtEl>
+                                        <p:attrNameLst>
+                                          <p:attrName>style.visibility</p:attrName>
+                                        </p:attrNameLst>
+                                      </p:cBhvr>
+                                      <p:to>
+                                        <p:strVal val="visible"/>
+                                      </p:to>
+                                    </p:set>
+                                    <p:anim calcmode="lin" valueType="num">
+                                      <p:cBhvr additive="base">
+                                        <p:cTn id="13" dur="500" fill="hold"/>
+                                        <p:tgtEl>
+                                          <p:spTgt spid="3">
+                                            <p:txEl>
+                                              <p:pRg st="1" end="1"/>
+                                            </p:txEl>
+                                          </p:spTgt>
+                                        </p:tgtEl>
+                                        <p:attrNameLst>
+                                          <p:attrName>ppt_x</p:attrName>
+                                        </p:attrNameLst>
+                                      </p:cBhvr>
+                                      <p:tavLst>
+                                        <p:tav tm="0">
+                                          <p:val>
+                                            <p:strVal val="#ppt_x"/>
+                                          </p:val>
+                                        </p:tav>
+                                        <p:tav tm="100000">
+                                          <p:val>
+                                            <p:strVal val="#ppt_x"/>
+                                          </p:val>
+                                        </p:tav>
+                                      </p:tavLst>
+                                    </p:anim>
+                                    <p:anim calcmode="lin" valueType="num">
+                                      <p:cBhvr additive="base">
+                                        <p:cTn id="14" dur="500" fill="hold"/>
+                                        <p:tgtEl>
+                                          <p:spTgt spid="3">
+                                            <p:txEl>
+                                              <p:pRg st="1" end="1"/>
+                                            </p:txEl>
+                                          </p:spTgt>
+                                        </p:tgtEl>
+                                        <p:attrNameLst>
+                                          <p:attrName>ppt_y</p:attrName>
+                                        </p:attrNameLst>
+                                      </p:cBhvr>
+                                      <p:tavLst>
+                                        <p:tav tm="0">
+                                          <p:val>
+                                            <p:strVal val="1+#ppt_h/2"/>
+                                          </p:val>
+                                        </p:tav>
+                                        <p:tav tm="100000">
+                                          <p:val>
+                                            <p:strVal val="#ppt_y"/>
+                                          </p:val>
+                                        </p:tav>
+                                      </p:tavLst>
+                                    </p:anim>
+                                  </p:childTnLst>
+                                </p:cTn>
+                              </p:par>
+                            </p:childTnLst>
+                          </p:cTn>
+                        </p:par>
+                      </p:childTnLst>
+                    </p:cTn>
+                  </p:par>
+                  <p:par>
+                    <p:cTn id="15" fill="hold">
+                      <p:stCondLst>
+                        <p:cond delay="indefinite"/>
+                      </p:stCondLst>
+                      <p:childTnLst>
+                        <p:par>
+                          <p:cTn id="16" fill="hold">
+                            <p:stCondLst>
+                              <p:cond delay="0"/>
+                            </p:stCondLst>
+                            <p:childTnLst>
+                              <p:par>
+                                <p:cTn id="17" presetID="2" presetClass="entr" presetSubtype="4" fill="hold" nodeType="clickEffect">
+                                  <p:stCondLst>
+                                    <p:cond delay="0"/>
+                                  </p:stCondLst>
+                                  <p:childTnLst>
+                                    <p:set>
+                                      <p:cBhvr>
+                                        <p:cTn id="18" dur="1" fill="hold">
+                                          <p:stCondLst>
+                                            <p:cond delay="0"/>
+                                          </p:stCondLst>
+                                        </p:cTn>
+                                        <p:tgtEl>
+                                          <p:spTgt spid="3">
+                                            <p:txEl>
+                                              <p:pRg st="2" end="2"/>
+                                            </p:txEl>
+                                          </p:spTgt>
+                                        </p:tgtEl>
+                                        <p:attrNameLst>
+                                          <p:attrName>style.visibility</p:attrName>
+                                        </p:attrNameLst>
+                                      </p:cBhvr>
+                                      <p:to>
+                                        <p:strVal val="visible"/>
+                                      </p:to>
+                                    </p:set>
+                                    <p:anim calcmode="lin" valueType="num">
+                                      <p:cBhvr additive="base">
+                                        <p:cTn id="19" dur="500" fill="hold"/>
+                                        <p:tgtEl>
+                                          <p:spTgt spid="3">
+                                            <p:txEl>
+                                              <p:pRg st="2" end="2"/>
+                                            </p:txEl>
+                                          </p:spTgt>
+                                        </p:tgtEl>
+                                        <p:attrNameLst>
+                                          <p:attrName>ppt_x</p:attrName>
+                                        </p:attrNameLst>
+                                      </p:cBhvr>
+                                      <p:tavLst>
+                                        <p:tav tm="0">
+                                          <p:val>
+                                            <p:strVal val="#ppt_x"/>
+                                          </p:val>
+                                        </p:tav>
+                                        <p:tav tm="100000">
+                                          <p:val>
+                                            <p:strVal val="#ppt_x"/>
+                                          </p:val>
+                                        </p:tav>
+                                      </p:tavLst>
+                                    </p:anim>
+                                    <p:anim calcmode="lin" valueType="num">
+                                      <p:cBhvr additive="base">
+                                        <p:cTn id="20" dur="500" fill="hold"/>
+                                        <p:tgtEl>
+                                          <p:spTgt spid="3">
+                                            <p:txEl>
+                                              <p:pRg st="2" end="2"/>
+                                            </p:txEl>
+                                          </p:spTgt>
+                                        </p:tgtEl>
+                                        <p:attrNameLst>
+                                          <p:attrName>ppt_y</p:attrName>
+                                        </p:attrNameLst>
+                                      </p:cBhvr>
+                                      <p:tavLst>
+                                        <p:tav tm="0">
+                                          <p:val>
+                                            <p:strVal val="1+#ppt_h/2"/>
+                                          </p:val>
+                                        </p:tav>
+                                        <p:tav tm="100000">
+                                          <p:val>
+                                            <p:strVal val="#ppt_y"/>
+                                          </p:val>
+                                        </p:tav>
+                                      </p:tavLst>
+                                    </p:anim>
+                                  </p:childTnLst>
+                                </p:cTn>
+                              </p:par>
+                            </p:childTnLst>
+                          </p:cTn>
+                        </p:par>
+                      </p:childTnLst>
+                    </p:cTn>
+                  </p:par>
+                  <p:par>
+                    <p:cTn id="21" fill="hold">
+                      <p:stCondLst>
+                        <p:cond delay="indefinite"/>
+                      </p:stCondLst>
+                      <p:childTnLst>
+                        <p:par>
+                          <p:cTn id="22" fill="hold">
+                            <p:stCondLst>
+                              <p:cond delay="0"/>
+                            </p:stCondLst>
+                            <p:childTnLst>
+                              <p:par>
+                                <p:cTn id="23" presetID="2" presetClass="entr" presetSubtype="4" fill="hold" nodeType="clickEffect">
+                                  <p:stCondLst>
+                                    <p:cond delay="0"/>
+                                  </p:stCondLst>
+                                  <p:childTnLst>
+                                    <p:set>
+                                      <p:cBhvr>
+                                        <p:cTn id="24" dur="1" fill="hold">
+                                          <p:stCondLst>
+                                            <p:cond delay="0"/>
+                                          </p:stCondLst>
+                                        </p:cTn>
+                                        <p:tgtEl>
+                                          <p:spTgt spid="3">
+                                            <p:txEl>
+                                              <p:pRg st="3" end="3"/>
+                                            </p:txEl>
+                                          </p:spTgt>
+                                        </p:tgtEl>
+                                        <p:attrNameLst>
+                                          <p:attrName>style.visibility</p:attrName>
+                                        </p:attrNameLst>
+                                      </p:cBhvr>
+                                      <p:to>
+                                        <p:strVal val="visible"/>
+                                      </p:to>
+                                    </p:set>
+                                    <p:anim calcmode="lin" valueType="num">
+                                      <p:cBhvr additive="base">
+                                        <p:cTn id="25" dur="500" fill="hold"/>
+                                        <p:tgtEl>
+                                          <p:spTgt spid="3">
+                                            <p:txEl>
+                                              <p:pRg st="3" end="3"/>
+                                            </p:txEl>
+                                          </p:spTgt>
+                                        </p:tgtEl>
+                                        <p:attrNameLst>
+                                          <p:attrName>ppt_x</p:attrName>
+                                        </p:attrNameLst>
+                                      </p:cBhvr>
+                                      <p:tavLst>
+                                        <p:tav tm="0">
+                                          <p:val>
+                                            <p:strVal val="#ppt_x"/>
+                                          </p:val>
+                                        </p:tav>
+                                        <p:tav tm="100000">
+                                          <p:val>
+                                            <p:strVal val="#ppt_x"/>
+                                          </p:val>
+                                        </p:tav>
+                                      </p:tavLst>
+                                    </p:anim>
+                                    <p:anim calcmode="lin" valueType="num">
+                                      <p:cBhvr additive="base">
+                                        <p:cTn id="26" dur="500" fill="hold"/>
+                                        <p:tgtEl>
+                                          <p:spTgt spid="3">
+                                            <p:txEl>
+                                              <p:pRg st="3" end="3"/>
+                                            </p:txEl>
+                                          </p:spTgt>
+                                        </p:tgtEl>
+                                        <p:attrNameLst>
+                                          <p:attrName>ppt_y</p:attrName>
+                                        </p:attrNameLst>
+                                      </p:cBhvr>
+                                      <p:tavLst>
+                                        <p:tav tm="0">
+                                          <p:val>
+                                            <p:strVal val="1+#ppt_h/2"/>
+                                          </p:val>
+                                        </p:tav>
+                                        <p:tav tm="100000">
+                                          <p:val>
+                                            <p:strVal val="#ppt_y"/>
+                                          </p:val>
+                                        </p:tav>
+                                      </p:tavLst>
+                                    </p:anim>
+                                  </p:childTnLst>
+                                </p:cTn>
+                              </p:par>
+                            </p:childTnLst>
+                          </p:cTn>
+                        </p:par>
+                      </p:childTnLst>
+                    </p:cTn>
+                  </p:par>
+                  <p:par>
+                    <p:cTn id="27" fill="hold">
+                      <p:stCondLst>
+                        <p:cond delay="indefinite"/>
+                      </p:stCondLst>
+                      <p:childTnLst>
+                        <p:par>
+                          <p:cTn id="28" fill="hold">
+                            <p:stCondLst>
+                              <p:cond delay="0"/>
+                            </p:stCondLst>
+                            <p:childTnLst>
+                              <p:par>
+                                <p:cTn id="29" presetID="2" presetClass="entr" presetSubtype="4" fill="hold" nodeType="clickEffect">
+                                  <p:stCondLst>
+                                    <p:cond delay="0"/>
+                                  </p:stCondLst>
+                                  <p:childTnLst>
+                                    <p:set>
+                                      <p:cBhvr>
+                                        <p:cTn id="30" dur="1" fill="hold">
+                                          <p:stCondLst>
+                                            <p:cond delay="0"/>
+                                          </p:stCondLst>
+                                        </p:cTn>
+                                        <p:tgtEl>
+                                          <p:spTgt spid="3">
+                                            <p:txEl>
+                                              <p:pRg st="4" end="4"/>
+                                            </p:txEl>
+                                          </p:spTgt>
+                                        </p:tgtEl>
+                                        <p:attrNameLst>
+                                          <p:attrName>style.visibility</p:attrName>
+                                        </p:attrNameLst>
+                                      </p:cBhvr>
+                                      <p:to>
+                                        <p:strVal val="visible"/>
+                                      </p:to>
+                                    </p:set>
+                                    <p:anim calcmode="lin" valueType="num">
+                                      <p:cBhvr additive="base">
+                                        <p:cTn id="31" dur="500" fill="hold"/>
+                                        <p:tgtEl>
+                                          <p:spTgt spid="3">
+                                            <p:txEl>
+                                              <p:pRg st="4" end="4"/>
+                                            </p:txEl>
+                                          </p:spTgt>
+                                        </p:tgtEl>
+                                        <p:attrNameLst>
+                                          <p:attrName>ppt_x</p:attrName>
+                                        </p:attrNameLst>
+                                      </p:cBhvr>
+                                      <p:tavLst>
+                                        <p:tav tm="0">
+                                          <p:val>
+                                            <p:strVal val="#ppt_x"/>
+                                          </p:val>
+                                        </p:tav>
+                                        <p:tav tm="100000">
+                                          <p:val>
+                                            <p:strVal val="#ppt_x"/>
+                                          </p:val>
+                                        </p:tav>
+                                      </p:tavLst>
+                                    </p:anim>
+                                    <p:anim calcmode="lin" valueType="num">
+                                      <p:cBhvr additive="base">
+                                        <p:cTn id="32" dur="500" fill="hold"/>
+                                        <p:tgtEl>
+                                          <p:spTgt spid="3">
+                                            <p:txEl>
+                                              <p:pRg st="4" end="4"/>
+                                            </p:txEl>
+                                          </p:spTgt>
+                                        </p:tgtEl>
+                                        <p:attrNameLst>
+                                          <p:attrName>ppt_y</p:attrName>
+                                        </p:attrNameLst>
+                                      </p:cBhvr>
+                                      <p:tavLst>
+                                        <p:tav tm="0">
+                                          <p:val>
+                                            <p:strVal val="1+#ppt_h/2"/>
+                                          </p:val>
+                                        </p:tav>
+                                        <p:tav tm="100000">
+                                          <p:val>
+                                            <p:strVal val="#ppt_y"/>
+                                          </p:val>
+                                        </p:tav>
+                                      </p:tavLst>
+                                    </p:anim>
+                                  </p:childTnLst>
+                                </p:cTn>
+                              </p:par>
+                              <p:par>
+                                <p:cTn id="33" presetID="2" presetClass="entr" presetSubtype="4" fill="hold" nodeType="withEffect">
+                                  <p:stCondLst>
+                                    <p:cond delay="0"/>
+                                  </p:stCondLst>
+                                  <p:childTnLst>
+                                    <p:set>
+                                      <p:cBhvr>
+                                        <p:cTn id="34" dur="1" fill="hold">
+                                          <p:stCondLst>
+                                            <p:cond delay="0"/>
+                                          </p:stCondLst>
+                                        </p:cTn>
+                                        <p:tgtEl>
+                                          <p:spTgt spid="3">
+                                            <p:txEl>
+                                              <p:pRg st="5" end="5"/>
+                                            </p:txEl>
+                                          </p:spTgt>
+                                        </p:tgtEl>
+                                        <p:attrNameLst>
+                                          <p:attrName>style.visibility</p:attrName>
+                                        </p:attrNameLst>
+                                      </p:cBhvr>
+                                      <p:to>
+                                        <p:strVal val="visible"/>
+                                      </p:to>
+                                    </p:set>
+                                    <p:anim calcmode="lin" valueType="num">
+                                      <p:cBhvr additive="base">
+                                        <p:cTn id="35" dur="500" fill="hold"/>
+                                        <p:tgtEl>
+                                          <p:spTgt spid="3">
+                                            <p:txEl>
+                                              <p:pRg st="5" end="5"/>
+                                            </p:txEl>
+                                          </p:spTgt>
+                                        </p:tgtEl>
+                                        <p:attrNameLst>
+                                          <p:attrName>ppt_x</p:attrName>
+                                        </p:attrNameLst>
+                                      </p:cBhvr>
+                                      <p:tavLst>
+                                        <p:tav tm="0">
+                                          <p:val>
+                                            <p:strVal val="#ppt_x"/>
+                                          </p:val>
+                                        </p:tav>
+                                        <p:tav tm="100000">
+                                          <p:val>
+                                            <p:strVal val="#ppt_x"/>
+                                          </p:val>
+                                        </p:tav>
+                                      </p:tavLst>
+                                    </p:anim>
+                                    <p:anim calcmode="lin" valueType="num">
+                                      <p:cBhvr additive="base">
+                                        <p:cTn id="36" dur="500" fill="hold"/>
+                                        <p:tgtEl>
+                                          <p:spTgt spid="3">
+                                            <p:txEl>
+                                              <p:pRg st="5" end="5"/>
+                                            </p:txEl>
+                                          </p:spTgt>
+                                        </p:tgtEl>
+                                        <p:attrNameLst>
+                                          <p:attrName>ppt_y</p:attrName>
+                                        </p:attrNameLst>
+                                      </p:cBhvr>
+                                      <p:tavLst>
+                                        <p:tav tm="0">
+                                          <p:val>
+                                            <p:strVal val="1+#ppt_h/2"/>
+                                          </p:val>
+                                        </p:tav>
+                                        <p:tav tm="100000">
+                                          <p:val>
+                                            <p:strVal val="#ppt_y"/>
+                                          </p:val>
+                                        </p:tav>
+                                      </p:tavLst>
+                                    </p:anim>
+                                  </p:childTnLst>
+                                </p:cTn>
+                              </p:par>
+                            </p:childTnLst>
+                          </p:cTn>
+                        </p:par>
+                      </p:childTnLst>
+                    </p:cTn>
+                  </p:par>
+                </p:childTnLst>
+              </p:cTn>
+              <p:prevCondLst>
+                <p:cond evt="onPrev" delay="0">
+                  <p:tgtEl>
+                    <p:sldTgt/>
+                  </p:tgtEl>
+                </p:cond>
+              </p:prevCondLst>
+              <p:nextCondLst>
+                <p:cond evt="onNext" delay="0">
+                  <p:tgtEl>
+                    <p:sldTgt/>
+                  </p:tgtEl>
+                </p:cond>
+              </p:nextCondLst>
+            </p:seq>
+          </p:childTnLst>
+        </p:cTn>
+      </p:par>
+    </p:tnLst>
+  </p:timing>
 </p:sld>
 </file>
 

</xml_diff>

<commit_message>
Small Updates for Boston Powershell User Group
</commit_message>
<xml_diff>
--- a/Presentation/Summit-Pester.pptx
+++ b/Presentation/Summit-Pester.pptx
@@ -359,7 +359,7 @@
             <a:fld id="{B61BEF0D-F0BB-DE4B-95CE-6DB70DBA9567}" type="datetimeFigureOut">
               <a:rPr lang="en-US" smtClean="0"/>
               <a:pPr/>
-              <a:t>4/11/2018</a:t>
+              <a:t>4/26/2018</a:t>
             </a:fld>
             <a:endParaRPr lang="en-US" dirty="0"/>
           </a:p>
@@ -939,7 +939,7 @@
             <a:fld id="{B61BEF0D-F0BB-DE4B-95CE-6DB70DBA9567}" type="datetimeFigureOut">
               <a:rPr lang="en-US" smtClean="0"/>
               <a:pPr/>
-              <a:t>4/11/2018</a:t>
+              <a:t>4/26/2018</a:t>
             </a:fld>
             <a:endParaRPr lang="en-US" dirty="0"/>
           </a:p>
@@ -1181,7 +1181,7 @@
             <a:fld id="{B61BEF0D-F0BB-DE4B-95CE-6DB70DBA9567}" type="datetimeFigureOut">
               <a:rPr lang="en-US" smtClean="0"/>
               <a:pPr/>
-              <a:t>4/11/2018</a:t>
+              <a:t>4/26/2018</a:t>
             </a:fld>
             <a:endParaRPr lang="en-US" dirty="0"/>
           </a:p>
@@ -1437,7 +1437,7 @@
             <a:fld id="{B61BEF0D-F0BB-DE4B-95CE-6DB70DBA9567}" type="datetimeFigureOut">
               <a:rPr lang="en-US" smtClean="0"/>
               <a:pPr/>
-              <a:t>4/11/2018</a:t>
+              <a:t>4/26/2018</a:t>
             </a:fld>
             <a:endParaRPr lang="en-US" dirty="0"/>
           </a:p>
@@ -1798,7 +1798,7 @@
             <a:fld id="{B61BEF0D-F0BB-DE4B-95CE-6DB70DBA9567}" type="datetimeFigureOut">
               <a:rPr lang="en-US" smtClean="0"/>
               <a:pPr/>
-              <a:t>4/11/2018</a:t>
+              <a:t>4/26/2018</a:t>
             </a:fld>
             <a:endParaRPr lang="en-US" dirty="0"/>
           </a:p>
@@ -1912,7 +1912,7 @@
             <a:fld id="{B61BEF0D-F0BB-DE4B-95CE-6DB70DBA9567}" type="datetimeFigureOut">
               <a:rPr lang="en-US" smtClean="0"/>
               <a:pPr/>
-              <a:t>4/11/2018</a:t>
+              <a:t>4/26/2018</a:t>
             </a:fld>
             <a:endParaRPr lang="en-US" dirty="0"/>
           </a:p>
@@ -2004,7 +2004,7 @@
             <a:fld id="{B61BEF0D-F0BB-DE4B-95CE-6DB70DBA9567}" type="datetimeFigureOut">
               <a:rPr lang="en-US" smtClean="0"/>
               <a:pPr/>
-              <a:t>4/11/2018</a:t>
+              <a:t>4/26/2018</a:t>
             </a:fld>
             <a:endParaRPr lang="en-US" dirty="0"/>
           </a:p>
@@ -2276,7 +2276,7 @@
             <a:fld id="{B61BEF0D-F0BB-DE4B-95CE-6DB70DBA9567}" type="datetimeFigureOut">
               <a:rPr lang="en-US" smtClean="0"/>
               <a:pPr/>
-              <a:t>4/11/2018</a:t>
+              <a:t>4/26/2018</a:t>
             </a:fld>
             <a:endParaRPr lang="en-US" dirty="0"/>
           </a:p>
@@ -2525,7 +2525,7 @@
             <a:fld id="{B61BEF0D-F0BB-DE4B-95CE-6DB70DBA9567}" type="datetimeFigureOut">
               <a:rPr lang="en-US" smtClean="0"/>
               <a:pPr/>
-              <a:t>4/11/2018</a:t>
+              <a:t>4/26/2018</a:t>
             </a:fld>
             <a:endParaRPr lang="en-US" dirty="0"/>
           </a:p>
@@ -2733,7 +2733,7 @@
             <a:fld id="{B61BEF0D-F0BB-DE4B-95CE-6DB70DBA9567}" type="datetimeFigureOut">
               <a:rPr lang="en-US" smtClean="0"/>
               <a:pPr/>
-              <a:t>4/11/2018</a:t>
+              <a:t>4/26/2018</a:t>
             </a:fld>
             <a:endParaRPr lang="en-US" dirty="0"/>
           </a:p>
@@ -3391,11 +3391,10 @@
       </p:sp>
       <p:pic>
         <p:nvPicPr>
-          <p:cNvPr id="5" name="Content Placeholder 4">
-            <a:hlinkClick r:id="rId2"/>
+          <p:cNvPr id="7" name="Content Placeholder 6">
             <a:extLst>
               <a:ext uri="{FF2B5EF4-FFF2-40B4-BE49-F238E27FC236}">
-                <a16:creationId xmlns:a16="http://schemas.microsoft.com/office/drawing/2014/main" id="{42A7E10D-18AB-420B-B8EA-A457B8D06855}"/>
+                <a16:creationId xmlns:a16="http://schemas.microsoft.com/office/drawing/2014/main" id="{65663EA9-5E8F-4629-ACD5-BB691BD3FA95}"/>
               </a:ext>
             </a:extLst>
           </p:cNvPr>
@@ -3407,15 +3406,15 @@
           </p:nvPr>
         </p:nvPicPr>
         <p:blipFill>
-          <a:blip r:embed="rId3"/>
+          <a:blip r:embed="rId2"/>
           <a:stretch>
             <a:fillRect/>
           </a:stretch>
         </p:blipFill>
         <p:spPr>
           <a:xfrm>
-            <a:off x="2981444" y="1690688"/>
-            <a:ext cx="6229112" cy="4671834"/>
+            <a:off x="2709617" y="1690688"/>
+            <a:ext cx="6772766" cy="4492601"/>
           </a:xfrm>
         </p:spPr>
       </p:pic>
@@ -3429,127 +3428,6 @@
   <p:clrMapOvr>
     <a:masterClrMapping/>
   </p:clrMapOvr>
-  <p:timing>
-    <p:tnLst>
-      <p:par>
-        <p:cTn id="1" dur="indefinite" restart="never" nodeType="tmRoot">
-          <p:childTnLst>
-            <p:seq concurrent="1" nextAc="seek">
-              <p:cTn id="2" dur="indefinite" nodeType="mainSeq">
-                <p:childTnLst>
-                  <p:par>
-                    <p:cTn id="3" fill="hold">
-                      <p:stCondLst>
-                        <p:cond delay="indefinite"/>
-                      </p:stCondLst>
-                      <p:childTnLst>
-                        <p:par>
-                          <p:cTn id="4" fill="hold">
-                            <p:stCondLst>
-                              <p:cond delay="0"/>
-                            </p:stCondLst>
-                            <p:childTnLst>
-                              <p:par>
-                                <p:cTn id="5" presetID="2" presetClass="entr" presetSubtype="4" fill="hold" nodeType="clickEffect">
-                                  <p:stCondLst>
-                                    <p:cond delay="0"/>
-                                  </p:stCondLst>
-                                  <p:childTnLst>
-                                    <p:set>
-                                      <p:cBhvr>
-                                        <p:cTn id="6" dur="1" fill="hold">
-                                          <p:stCondLst>
-                                            <p:cond delay="0"/>
-                                          </p:stCondLst>
-                                        </p:cTn>
-                                        <p:tgtEl>
-                                          <p:spTgt spid="5"/>
-                                        </p:tgtEl>
-                                        <p:attrNameLst>
-                                          <p:attrName>style.visibility</p:attrName>
-                                        </p:attrNameLst>
-                                      </p:cBhvr>
-                                      <p:to>
-                                        <p:strVal val="visible"/>
-                                      </p:to>
-                                    </p:set>
-                                    <p:anim calcmode="lin" valueType="num">
-                                      <p:cBhvr additive="base">
-                                        <p:cTn id="7" dur="500" fill="hold"/>
-                                        <p:tgtEl>
-                                          <p:spTgt spid="5"/>
-                                        </p:tgtEl>
-                                        <p:attrNameLst>
-                                          <p:attrName>ppt_x</p:attrName>
-                                        </p:attrNameLst>
-                                      </p:cBhvr>
-                                      <p:tavLst>
-                                        <p:tav tm="0">
-                                          <p:val>
-                                            <p:strVal val="#ppt_x"/>
-                                          </p:val>
-                                        </p:tav>
-                                        <p:tav tm="100000">
-                                          <p:val>
-                                            <p:strVal val="#ppt_x"/>
-                                          </p:val>
-                                        </p:tav>
-                                      </p:tavLst>
-                                    </p:anim>
-                                    <p:anim calcmode="lin" valueType="num">
-                                      <p:cBhvr additive="base">
-                                        <p:cTn id="8" dur="500" fill="hold"/>
-                                        <p:tgtEl>
-                                          <p:spTgt spid="5"/>
-                                        </p:tgtEl>
-                                        <p:attrNameLst>
-                                          <p:attrName>ppt_y</p:attrName>
-                                        </p:attrNameLst>
-                                      </p:cBhvr>
-                                      <p:tavLst>
-                                        <p:tav tm="0">
-                                          <p:val>
-                                            <p:strVal val="1+#ppt_h/2"/>
-                                          </p:val>
-                                        </p:tav>
-                                        <p:tav tm="100000">
-                                          <p:val>
-                                            <p:strVal val="#ppt_y"/>
-                                          </p:val>
-                                        </p:tav>
-                                      </p:tavLst>
-                                    </p:anim>
-                                  </p:childTnLst>
-                                </p:cTn>
-                              </p:par>
-                            </p:childTnLst>
-                          </p:cTn>
-                        </p:par>
-                      </p:childTnLst>
-                    </p:cTn>
-                  </p:par>
-                </p:childTnLst>
-              </p:cTn>
-              <p:prevCondLst>
-                <p:cond evt="onPrev" delay="0">
-                  <p:tgtEl>
-                    <p:sldTgt/>
-                  </p:tgtEl>
-                </p:cond>
-              </p:prevCondLst>
-              <p:nextCondLst>
-                <p:cond evt="onNext" delay="0">
-                  <p:tgtEl>
-                    <p:sldTgt/>
-                  </p:tgtEl>
-                </p:cond>
-              </p:nextCondLst>
-            </p:seq>
-          </p:childTnLst>
-        </p:cTn>
-      </p:par>
-    </p:tnLst>
-  </p:timing>
 </p:sld>
 </file>
 
@@ -3600,11 +3478,10 @@
       </p:sp>
       <p:pic>
         <p:nvPicPr>
-          <p:cNvPr id="6" name="Content Placeholder 5">
-            <a:hlinkClick r:id="rId2"/>
+          <p:cNvPr id="7" name="Content Placeholder 6">
             <a:extLst>
               <a:ext uri="{FF2B5EF4-FFF2-40B4-BE49-F238E27FC236}">
-                <a16:creationId xmlns:a16="http://schemas.microsoft.com/office/drawing/2014/main" id="{6A59BDA7-0C29-46ED-80A7-D234A7F5F615}"/>
+                <a16:creationId xmlns:a16="http://schemas.microsoft.com/office/drawing/2014/main" id="{BA2DE4DA-912B-4461-8D02-8BFA421F8641}"/>
               </a:ext>
             </a:extLst>
           </p:cNvPr>
@@ -3616,15 +3493,15 @@
           </p:nvPr>
         </p:nvPicPr>
         <p:blipFill>
-          <a:blip r:embed="rId3"/>
+          <a:blip r:embed="rId2"/>
           <a:stretch>
             <a:fillRect/>
           </a:stretch>
         </p:blipFill>
         <p:spPr>
           <a:xfrm>
-            <a:off x="2160600" y="1394824"/>
-            <a:ext cx="7870800" cy="4931578"/>
+            <a:off x="3195108" y="1825625"/>
+            <a:ext cx="5801784" cy="4351338"/>
           </a:xfrm>
         </p:spPr>
       </p:pic>
@@ -3638,127 +3515,6 @@
   <p:clrMapOvr>
     <a:masterClrMapping/>
   </p:clrMapOvr>
-  <p:timing>
-    <p:tnLst>
-      <p:par>
-        <p:cTn id="1" dur="indefinite" restart="never" nodeType="tmRoot">
-          <p:childTnLst>
-            <p:seq concurrent="1" nextAc="seek">
-              <p:cTn id="2" dur="indefinite" nodeType="mainSeq">
-                <p:childTnLst>
-                  <p:par>
-                    <p:cTn id="3" fill="hold">
-                      <p:stCondLst>
-                        <p:cond delay="indefinite"/>
-                      </p:stCondLst>
-                      <p:childTnLst>
-                        <p:par>
-                          <p:cTn id="4" fill="hold">
-                            <p:stCondLst>
-                              <p:cond delay="0"/>
-                            </p:stCondLst>
-                            <p:childTnLst>
-                              <p:par>
-                                <p:cTn id="5" presetID="2" presetClass="entr" presetSubtype="4" fill="hold" nodeType="clickEffect">
-                                  <p:stCondLst>
-                                    <p:cond delay="0"/>
-                                  </p:stCondLst>
-                                  <p:childTnLst>
-                                    <p:set>
-                                      <p:cBhvr>
-                                        <p:cTn id="6" dur="1" fill="hold">
-                                          <p:stCondLst>
-                                            <p:cond delay="0"/>
-                                          </p:stCondLst>
-                                        </p:cTn>
-                                        <p:tgtEl>
-                                          <p:spTgt spid="6"/>
-                                        </p:tgtEl>
-                                        <p:attrNameLst>
-                                          <p:attrName>style.visibility</p:attrName>
-                                        </p:attrNameLst>
-                                      </p:cBhvr>
-                                      <p:to>
-                                        <p:strVal val="visible"/>
-                                      </p:to>
-                                    </p:set>
-                                    <p:anim calcmode="lin" valueType="num">
-                                      <p:cBhvr additive="base">
-                                        <p:cTn id="7" dur="500" fill="hold"/>
-                                        <p:tgtEl>
-                                          <p:spTgt spid="6"/>
-                                        </p:tgtEl>
-                                        <p:attrNameLst>
-                                          <p:attrName>ppt_x</p:attrName>
-                                        </p:attrNameLst>
-                                      </p:cBhvr>
-                                      <p:tavLst>
-                                        <p:tav tm="0">
-                                          <p:val>
-                                            <p:strVal val="#ppt_x"/>
-                                          </p:val>
-                                        </p:tav>
-                                        <p:tav tm="100000">
-                                          <p:val>
-                                            <p:strVal val="#ppt_x"/>
-                                          </p:val>
-                                        </p:tav>
-                                      </p:tavLst>
-                                    </p:anim>
-                                    <p:anim calcmode="lin" valueType="num">
-                                      <p:cBhvr additive="base">
-                                        <p:cTn id="8" dur="500" fill="hold"/>
-                                        <p:tgtEl>
-                                          <p:spTgt spid="6"/>
-                                        </p:tgtEl>
-                                        <p:attrNameLst>
-                                          <p:attrName>ppt_y</p:attrName>
-                                        </p:attrNameLst>
-                                      </p:cBhvr>
-                                      <p:tavLst>
-                                        <p:tav tm="0">
-                                          <p:val>
-                                            <p:strVal val="1+#ppt_h/2"/>
-                                          </p:val>
-                                        </p:tav>
-                                        <p:tav tm="100000">
-                                          <p:val>
-                                            <p:strVal val="#ppt_y"/>
-                                          </p:val>
-                                        </p:tav>
-                                      </p:tavLst>
-                                    </p:anim>
-                                  </p:childTnLst>
-                                </p:cTn>
-                              </p:par>
-                            </p:childTnLst>
-                          </p:cTn>
-                        </p:par>
-                      </p:childTnLst>
-                    </p:cTn>
-                  </p:par>
-                </p:childTnLst>
-              </p:cTn>
-              <p:prevCondLst>
-                <p:cond evt="onPrev" delay="0">
-                  <p:tgtEl>
-                    <p:sldTgt/>
-                  </p:tgtEl>
-                </p:cond>
-              </p:prevCondLst>
-              <p:nextCondLst>
-                <p:cond evt="onNext" delay="0">
-                  <p:tgtEl>
-                    <p:sldTgt/>
-                  </p:tgtEl>
-                </p:cond>
-              </p:nextCondLst>
-            </p:seq>
-          </p:childTnLst>
-        </p:cTn>
-      </p:par>
-    </p:tnLst>
-  </p:timing>
 </p:sld>
 </file>
 

</xml_diff>